<commit_message>
made changes to slides
</commit_message>
<xml_diff>
--- a/crime_detectives_presentation.pptx
+++ b/crime_detectives_presentation.pptx
@@ -12,22 +12,21 @@
     <p:sldId id="260" r:id="rId6"/>
     <p:sldId id="262" r:id="rId7"/>
     <p:sldId id="263" r:id="rId8"/>
-    <p:sldId id="264" r:id="rId9"/>
-    <p:sldId id="265" r:id="rId10"/>
-    <p:sldId id="266" r:id="rId11"/>
-    <p:sldId id="267" r:id="rId12"/>
-    <p:sldId id="268" r:id="rId13"/>
-    <p:sldId id="269" r:id="rId14"/>
-    <p:sldId id="270" r:id="rId15"/>
-    <p:sldId id="273" r:id="rId16"/>
-    <p:sldId id="271" r:id="rId17"/>
-    <p:sldId id="272" r:id="rId18"/>
-    <p:sldId id="279" r:id="rId19"/>
-    <p:sldId id="274" r:id="rId20"/>
-    <p:sldId id="275" r:id="rId21"/>
-    <p:sldId id="276" r:id="rId22"/>
-    <p:sldId id="277" r:id="rId23"/>
-    <p:sldId id="259" r:id="rId24"/>
+    <p:sldId id="265" r:id="rId9"/>
+    <p:sldId id="266" r:id="rId10"/>
+    <p:sldId id="267" r:id="rId11"/>
+    <p:sldId id="268" r:id="rId12"/>
+    <p:sldId id="269" r:id="rId13"/>
+    <p:sldId id="270" r:id="rId14"/>
+    <p:sldId id="273" r:id="rId15"/>
+    <p:sldId id="271" r:id="rId16"/>
+    <p:sldId id="272" r:id="rId17"/>
+    <p:sldId id="279" r:id="rId18"/>
+    <p:sldId id="274" r:id="rId19"/>
+    <p:sldId id="275" r:id="rId20"/>
+    <p:sldId id="276" r:id="rId21"/>
+    <p:sldId id="277" r:id="rId22"/>
+    <p:sldId id="259" r:id="rId23"/>
   </p:sldIdLst>
   <p:sldSz cx="12192000" cy="6858000"/>
   <p:notesSz cx="6858000" cy="9144000"/>
@@ -3506,99 +3505,6 @@
           <p:cNvPr id="2" name="Title 1">
             <a:extLst>
               <a:ext uri="{FF2B5EF4-FFF2-40B4-BE49-F238E27FC236}">
-                <a16:creationId xmlns:a16="http://schemas.microsoft.com/office/drawing/2014/main" id="{DCC04647-5B28-E746-8D55-E14BD3318677}"/>
-              </a:ext>
-            </a:extLst>
-          </p:cNvPr>
-          <p:cNvSpPr>
-            <a:spLocks noGrp="1"/>
-          </p:cNvSpPr>
-          <p:nvPr>
-            <p:ph type="title"/>
-          </p:nvPr>
-        </p:nvSpPr>
-        <p:spPr>
-          <a:xfrm>
-            <a:off x="838200" y="5460998"/>
-            <a:ext cx="10515600" cy="1325563"/>
-          </a:xfrm>
-        </p:spPr>
-        <p:txBody>
-          <a:bodyPr/>
-          <a:lstStyle/>
-          <a:p>
-            <a:r>
-              <a:rPr lang="en-US" dirty="0"/>
-              <a:t>Persons who are black are more likely to be arrested</a:t>
-            </a:r>
-          </a:p>
-        </p:txBody>
-      </p:sp>
-      <p:pic>
-        <p:nvPicPr>
-          <p:cNvPr id="4" name="Picture 3">
-            <a:extLst>
-              <a:ext uri="{FF2B5EF4-FFF2-40B4-BE49-F238E27FC236}">
-                <a16:creationId xmlns:a16="http://schemas.microsoft.com/office/drawing/2014/main" id="{6BFD21A5-E570-F849-BCDE-81A03153EBB1}"/>
-              </a:ext>
-            </a:extLst>
-          </p:cNvPr>
-          <p:cNvPicPr>
-            <a:picLocks noChangeAspect="1"/>
-          </p:cNvPicPr>
-          <p:nvPr/>
-        </p:nvPicPr>
-        <p:blipFill>
-          <a:blip r:embed="rId2"/>
-          <a:stretch>
-            <a:fillRect/>
-          </a:stretch>
-        </p:blipFill>
-        <p:spPr>
-          <a:xfrm>
-            <a:off x="2201422" y="331786"/>
-            <a:ext cx="7789156" cy="5129212"/>
-          </a:xfrm>
-          <a:prstGeom prst="rect">
-            <a:avLst/>
-          </a:prstGeom>
-        </p:spPr>
-      </p:pic>
-    </p:spTree>
-    <p:extLst>
-      <p:ext uri="{BB962C8B-B14F-4D97-AF65-F5344CB8AC3E}">
-        <p14:creationId xmlns:p14="http://schemas.microsoft.com/office/powerpoint/2010/main" val="2968209747"/>
-      </p:ext>
-    </p:extLst>
-  </p:cSld>
-  <p:clrMapOvr>
-    <a:masterClrMapping/>
-  </p:clrMapOvr>
-</p:sld>
-</file>
-
-<file path=ppt/slides/slide11.xml><?xml version="1.0" encoding="utf-8"?>
-<p:sld xmlns:a="http://schemas.openxmlformats.org/drawingml/2006/main" xmlns:r="http://schemas.openxmlformats.org/officeDocument/2006/relationships" xmlns:p="http://schemas.openxmlformats.org/presentationml/2006/main">
-  <p:cSld>
-    <p:spTree>
-      <p:nvGrpSpPr>
-        <p:cNvPr id="1" name=""/>
-        <p:cNvGrpSpPr/>
-        <p:nvPr/>
-      </p:nvGrpSpPr>
-      <p:grpSpPr>
-        <a:xfrm>
-          <a:off x="0" y="0"/>
-          <a:ext cx="0" cy="0"/>
-          <a:chOff x="0" y="0"/>
-          <a:chExt cx="0" cy="0"/>
-        </a:xfrm>
-      </p:grpSpPr>
-      <p:sp>
-        <p:nvSpPr>
-          <p:cNvPr id="2" name="Title 1">
-            <a:extLst>
-              <a:ext uri="{FF2B5EF4-FFF2-40B4-BE49-F238E27FC236}">
                 <a16:creationId xmlns:a16="http://schemas.microsoft.com/office/drawing/2014/main" id="{87410226-C1D1-D549-BA0D-303A89013F57}"/>
               </a:ext>
             </a:extLst>
@@ -3672,7 +3578,7 @@
 </p:sld>
 </file>
 
-<file path=ppt/slides/slide12.xml><?xml version="1.0" encoding="utf-8"?>
+<file path=ppt/slides/slide11.xml><?xml version="1.0" encoding="utf-8"?>
 <p:sld xmlns:a="http://schemas.openxmlformats.org/drawingml/2006/main" xmlns:r="http://schemas.openxmlformats.org/officeDocument/2006/relationships" xmlns:p="http://schemas.openxmlformats.org/presentationml/2006/main">
   <p:cSld>
     <p:spTree>
@@ -3758,6 +3664,144 @@
     <p:extLst>
       <p:ext uri="{BB962C8B-B14F-4D97-AF65-F5344CB8AC3E}">
         <p14:creationId xmlns:p14="http://schemas.microsoft.com/office/powerpoint/2010/main" val="4091477506"/>
+      </p:ext>
+    </p:extLst>
+  </p:cSld>
+  <p:clrMapOvr>
+    <a:masterClrMapping/>
+  </p:clrMapOvr>
+</p:sld>
+</file>
+
+<file path=ppt/slides/slide12.xml><?xml version="1.0" encoding="utf-8"?>
+<p:sld xmlns:a="http://schemas.openxmlformats.org/drawingml/2006/main" xmlns:r="http://schemas.openxmlformats.org/officeDocument/2006/relationships" xmlns:p="http://schemas.openxmlformats.org/presentationml/2006/main">
+  <p:cSld>
+    <p:spTree>
+      <p:nvGrpSpPr>
+        <p:cNvPr id="1" name=""/>
+        <p:cNvGrpSpPr/>
+        <p:nvPr/>
+      </p:nvGrpSpPr>
+      <p:grpSpPr>
+        <a:xfrm>
+          <a:off x="0" y="0"/>
+          <a:ext cx="0" cy="0"/>
+          <a:chOff x="0" y="0"/>
+          <a:chExt cx="0" cy="0"/>
+        </a:xfrm>
+      </p:grpSpPr>
+      <p:pic>
+        <p:nvPicPr>
+          <p:cNvPr id="4" name="Picture 3">
+            <a:extLst>
+              <a:ext uri="{FF2B5EF4-FFF2-40B4-BE49-F238E27FC236}">
+                <a16:creationId xmlns:a16="http://schemas.microsoft.com/office/drawing/2014/main" id="{BD09BD1D-5C2A-C748-B41C-2B64DA2EBC49}"/>
+              </a:ext>
+            </a:extLst>
+          </p:cNvPr>
+          <p:cNvPicPr>
+            <a:picLocks noChangeAspect="1"/>
+          </p:cNvPicPr>
+          <p:nvPr/>
+        </p:nvPicPr>
+        <p:blipFill>
+          <a:blip r:embed="rId2"/>
+          <a:stretch>
+            <a:fillRect/>
+          </a:stretch>
+        </p:blipFill>
+        <p:spPr>
+          <a:xfrm>
+            <a:off x="380009" y="383731"/>
+            <a:ext cx="9664165" cy="6090537"/>
+          </a:xfrm>
+          <a:prstGeom prst="rect">
+            <a:avLst/>
+          </a:prstGeom>
+        </p:spPr>
+      </p:pic>
+      <p:sp>
+        <p:nvSpPr>
+          <p:cNvPr id="2" name="Title 1">
+            <a:extLst>
+              <a:ext uri="{FF2B5EF4-FFF2-40B4-BE49-F238E27FC236}">
+                <a16:creationId xmlns:a16="http://schemas.microsoft.com/office/drawing/2014/main" id="{81EA8BC8-6297-8D4B-9208-35A6DEAA09F5}"/>
+              </a:ext>
+            </a:extLst>
+          </p:cNvPr>
+          <p:cNvSpPr>
+            <a:spLocks noGrp="1"/>
+          </p:cNvSpPr>
+          <p:nvPr>
+            <p:ph type="title"/>
+          </p:nvPr>
+        </p:nvSpPr>
+        <p:spPr>
+          <a:xfrm>
+            <a:off x="4665826" y="597487"/>
+            <a:ext cx="6555180" cy="2442420"/>
+          </a:xfrm>
+        </p:spPr>
+        <p:txBody>
+          <a:bodyPr>
+            <a:normAutofit fontScale="90000"/>
+          </a:bodyPr>
+          <a:lstStyle/>
+          <a:p>
+            <a:r>
+              <a:rPr lang="en-US" sz="2800" b="1" dirty="0"/>
+              <a:t>One Hot Encoding</a:t>
+            </a:r>
+            <a:r>
+              <a:rPr lang="en-US" sz="2800" dirty="0"/>
+              <a:t>:</a:t>
+            </a:r>
+            <a:br>
+              <a:rPr lang="en-US" sz="2800" dirty="0"/>
+            </a:br>
+            <a:r>
+              <a:rPr lang="en-US" sz="2800" dirty="0"/>
+              <a:t>Because the numeric columns contain internal NYPD codes and are not measurements, for our model</a:t>
+            </a:r>
+            <a:r>
+              <a:rPr lang="en-US" sz="2800" dirty="0">
+                <a:solidFill>
+                  <a:srgbClr val="FF0000"/>
+                </a:solidFill>
+              </a:rPr>
+              <a:t> every</a:t>
+            </a:r>
+            <a:r>
+              <a:rPr lang="en-US" sz="2800" dirty="0"/>
+              <a:t> column is treated as </a:t>
+            </a:r>
+            <a:r>
+              <a:rPr lang="en-US" sz="2800" dirty="0">
+                <a:solidFill>
+                  <a:srgbClr val="FF0000"/>
+                </a:solidFill>
+              </a:rPr>
+              <a:t>nominal categorical</a:t>
+            </a:r>
+            <a:r>
+              <a:rPr lang="en-US" sz="2800" dirty="0"/>
+              <a:t> for our classification (</a:t>
+            </a:r>
+            <a:r>
+              <a:rPr lang="en-US" sz="2800" dirty="0" err="1"/>
+              <a:t>i.e</a:t>
+            </a:r>
+            <a:r>
+              <a:rPr lang="en-US" sz="2800" dirty="0"/>
+              <a:t>: there is no ordering to the values)</a:t>
+            </a:r>
+          </a:p>
+        </p:txBody>
+      </p:sp>
+    </p:spTree>
+    <p:extLst>
+      <p:ext uri="{BB962C8B-B14F-4D97-AF65-F5344CB8AC3E}">
+        <p14:creationId xmlns:p14="http://schemas.microsoft.com/office/powerpoint/2010/main" val="3603818625"/>
       </p:ext>
     </p:extLst>
   </p:cSld>
@@ -3784,144 +3828,6 @@
           <a:chExt cx="0" cy="0"/>
         </a:xfrm>
       </p:grpSpPr>
-      <p:pic>
-        <p:nvPicPr>
-          <p:cNvPr id="4" name="Picture 3">
-            <a:extLst>
-              <a:ext uri="{FF2B5EF4-FFF2-40B4-BE49-F238E27FC236}">
-                <a16:creationId xmlns:a16="http://schemas.microsoft.com/office/drawing/2014/main" id="{BD09BD1D-5C2A-C748-B41C-2B64DA2EBC49}"/>
-              </a:ext>
-            </a:extLst>
-          </p:cNvPr>
-          <p:cNvPicPr>
-            <a:picLocks noChangeAspect="1"/>
-          </p:cNvPicPr>
-          <p:nvPr/>
-        </p:nvPicPr>
-        <p:blipFill>
-          <a:blip r:embed="rId2"/>
-          <a:stretch>
-            <a:fillRect/>
-          </a:stretch>
-        </p:blipFill>
-        <p:spPr>
-          <a:xfrm>
-            <a:off x="380009" y="383731"/>
-            <a:ext cx="9664165" cy="6090537"/>
-          </a:xfrm>
-          <a:prstGeom prst="rect">
-            <a:avLst/>
-          </a:prstGeom>
-        </p:spPr>
-      </p:pic>
-      <p:sp>
-        <p:nvSpPr>
-          <p:cNvPr id="2" name="Title 1">
-            <a:extLst>
-              <a:ext uri="{FF2B5EF4-FFF2-40B4-BE49-F238E27FC236}">
-                <a16:creationId xmlns:a16="http://schemas.microsoft.com/office/drawing/2014/main" id="{81EA8BC8-6297-8D4B-9208-35A6DEAA09F5}"/>
-              </a:ext>
-            </a:extLst>
-          </p:cNvPr>
-          <p:cNvSpPr>
-            <a:spLocks noGrp="1"/>
-          </p:cNvSpPr>
-          <p:nvPr>
-            <p:ph type="title"/>
-          </p:nvPr>
-        </p:nvSpPr>
-        <p:spPr>
-          <a:xfrm>
-            <a:off x="4665826" y="597487"/>
-            <a:ext cx="6555180" cy="2442420"/>
-          </a:xfrm>
-        </p:spPr>
-        <p:txBody>
-          <a:bodyPr>
-            <a:normAutofit fontScale="90000"/>
-          </a:bodyPr>
-          <a:lstStyle/>
-          <a:p>
-            <a:r>
-              <a:rPr lang="en-US" sz="2800" b="1" dirty="0"/>
-              <a:t>One Hot Encoding</a:t>
-            </a:r>
-            <a:r>
-              <a:rPr lang="en-US" sz="2800" dirty="0"/>
-              <a:t>:</a:t>
-            </a:r>
-            <a:br>
-              <a:rPr lang="en-US" sz="2800" dirty="0"/>
-            </a:br>
-            <a:r>
-              <a:rPr lang="en-US" sz="2800" dirty="0"/>
-              <a:t>Because the numeric columns contain internal NYPD codes and are not measurements, for our model</a:t>
-            </a:r>
-            <a:r>
-              <a:rPr lang="en-US" sz="2800" dirty="0">
-                <a:solidFill>
-                  <a:srgbClr val="FF0000"/>
-                </a:solidFill>
-              </a:rPr>
-              <a:t> every</a:t>
-            </a:r>
-            <a:r>
-              <a:rPr lang="en-US" sz="2800" dirty="0"/>
-              <a:t> column is treated as </a:t>
-            </a:r>
-            <a:r>
-              <a:rPr lang="en-US" sz="2800" dirty="0">
-                <a:solidFill>
-                  <a:srgbClr val="FF0000"/>
-                </a:solidFill>
-              </a:rPr>
-              <a:t>nominal categorical</a:t>
-            </a:r>
-            <a:r>
-              <a:rPr lang="en-US" sz="2800" dirty="0"/>
-              <a:t> for our classification (</a:t>
-            </a:r>
-            <a:r>
-              <a:rPr lang="en-US" sz="2800" dirty="0" err="1"/>
-              <a:t>i.e</a:t>
-            </a:r>
-            <a:r>
-              <a:rPr lang="en-US" sz="2800" dirty="0"/>
-              <a:t>: there is no ordering to the values)</a:t>
-            </a:r>
-          </a:p>
-        </p:txBody>
-      </p:sp>
-    </p:spTree>
-    <p:extLst>
-      <p:ext uri="{BB962C8B-B14F-4D97-AF65-F5344CB8AC3E}">
-        <p14:creationId xmlns:p14="http://schemas.microsoft.com/office/powerpoint/2010/main" val="3603818625"/>
-      </p:ext>
-    </p:extLst>
-  </p:cSld>
-  <p:clrMapOvr>
-    <a:masterClrMapping/>
-  </p:clrMapOvr>
-</p:sld>
-</file>
-
-<file path=ppt/slides/slide14.xml><?xml version="1.0" encoding="utf-8"?>
-<p:sld xmlns:a="http://schemas.openxmlformats.org/drawingml/2006/main" xmlns:r="http://schemas.openxmlformats.org/officeDocument/2006/relationships" xmlns:p="http://schemas.openxmlformats.org/presentationml/2006/main">
-  <p:cSld>
-    <p:spTree>
-      <p:nvGrpSpPr>
-        <p:cNvPr id="1" name=""/>
-        <p:cNvGrpSpPr/>
-        <p:nvPr/>
-      </p:nvGrpSpPr>
-      <p:grpSpPr>
-        <a:xfrm>
-          <a:off x="0" y="0"/>
-          <a:ext cx="0" cy="0"/>
-          <a:chOff x="0" y="0"/>
-          <a:chExt cx="0" cy="0"/>
-        </a:xfrm>
-      </p:grpSpPr>
       <p:sp>
         <p:nvSpPr>
           <p:cNvPr id="2" name="Title 1">
@@ -4062,7 +3968,7 @@
 </p:sld>
 </file>
 
-<file path=ppt/slides/slide15.xml><?xml version="1.0" encoding="utf-8"?>
+<file path=ppt/slides/slide14.xml><?xml version="1.0" encoding="utf-8"?>
 <p:sld xmlns:a="http://schemas.openxmlformats.org/drawingml/2006/main" xmlns:r="http://schemas.openxmlformats.org/officeDocument/2006/relationships" xmlns:p="http://schemas.openxmlformats.org/presentationml/2006/main">
   <p:cSld>
     <p:spTree>
@@ -4298,7 +4204,7 @@
 </p:sld>
 </file>
 
-<file path=ppt/slides/slide16.xml><?xml version="1.0" encoding="utf-8"?>
+<file path=ppt/slides/slide15.xml><?xml version="1.0" encoding="utf-8"?>
 <p:sld xmlns:a="http://schemas.openxmlformats.org/drawingml/2006/main" xmlns:r="http://schemas.openxmlformats.org/officeDocument/2006/relationships" xmlns:p="http://schemas.openxmlformats.org/presentationml/2006/main">
   <p:cSld>
     <p:spTree>
@@ -4393,7 +4299,7 @@
 </p:sld>
 </file>
 
-<file path=ppt/slides/slide17.xml><?xml version="1.0" encoding="utf-8"?>
+<file path=ppt/slides/slide16.xml><?xml version="1.0" encoding="utf-8"?>
 <p:sld xmlns:a="http://schemas.openxmlformats.org/drawingml/2006/main" xmlns:r="http://schemas.openxmlformats.org/officeDocument/2006/relationships" xmlns:p="http://schemas.openxmlformats.org/presentationml/2006/main">
   <p:cSld>
     <p:bg>
@@ -5011,7 +4917,7 @@
 </p:sld>
 </file>
 
-<file path=ppt/slides/slide18.xml><?xml version="1.0" encoding="utf-8"?>
+<file path=ppt/slides/slide17.xml><?xml version="1.0" encoding="utf-8"?>
 <p:sld xmlns:a="http://schemas.openxmlformats.org/drawingml/2006/main" xmlns:r="http://schemas.openxmlformats.org/officeDocument/2006/relationships" xmlns:p="http://schemas.openxmlformats.org/presentationml/2006/main">
   <p:cSld>
     <p:spTree>
@@ -5134,7 +5040,7 @@
 </p:sld>
 </file>
 
-<file path=ppt/slides/slide19.xml><?xml version="1.0" encoding="utf-8"?>
+<file path=ppt/slides/slide18.xml><?xml version="1.0" encoding="utf-8"?>
 <p:sld xmlns:a="http://schemas.openxmlformats.org/drawingml/2006/main" xmlns:r="http://schemas.openxmlformats.org/officeDocument/2006/relationships" xmlns:p="http://schemas.openxmlformats.org/presentationml/2006/main">
   <p:cSld>
     <p:spTree>
@@ -5259,6 +5165,92 @@
 </p:sld>
 </file>
 
+<file path=ppt/slides/slide19.xml><?xml version="1.0" encoding="utf-8"?>
+<p:sld xmlns:a="http://schemas.openxmlformats.org/drawingml/2006/main" xmlns:r="http://schemas.openxmlformats.org/officeDocument/2006/relationships" xmlns:p="http://schemas.openxmlformats.org/presentationml/2006/main">
+  <p:cSld>
+    <p:spTree>
+      <p:nvGrpSpPr>
+        <p:cNvPr id="1" name=""/>
+        <p:cNvGrpSpPr/>
+        <p:nvPr/>
+      </p:nvGrpSpPr>
+      <p:grpSpPr>
+        <a:xfrm>
+          <a:off x="0" y="0"/>
+          <a:ext cx="0" cy="0"/>
+          <a:chOff x="0" y="0"/>
+          <a:chExt cx="0" cy="0"/>
+        </a:xfrm>
+      </p:grpSpPr>
+      <p:sp>
+        <p:nvSpPr>
+          <p:cNvPr id="2" name="Title 1">
+            <a:extLst>
+              <a:ext uri="{FF2B5EF4-FFF2-40B4-BE49-F238E27FC236}">
+                <a16:creationId xmlns:a16="http://schemas.microsoft.com/office/drawing/2014/main" id="{C577F47D-AA01-CE4E-8010-008851E94B25}"/>
+              </a:ext>
+            </a:extLst>
+          </p:cNvPr>
+          <p:cNvSpPr>
+            <a:spLocks noGrp="1"/>
+          </p:cNvSpPr>
+          <p:nvPr>
+            <p:ph type="title"/>
+          </p:nvPr>
+        </p:nvSpPr>
+        <p:spPr/>
+        <p:txBody>
+          <a:bodyPr/>
+          <a:lstStyle/>
+          <a:p>
+            <a:r>
+              <a:rPr lang="en-US" dirty="0"/>
+              <a:t>KNeighbours</a:t>
+            </a:r>
+          </a:p>
+        </p:txBody>
+      </p:sp>
+      <p:sp>
+        <p:nvSpPr>
+          <p:cNvPr id="3" name="Content Placeholder 2">
+            <a:extLst>
+              <a:ext uri="{FF2B5EF4-FFF2-40B4-BE49-F238E27FC236}">
+                <a16:creationId xmlns:a16="http://schemas.microsoft.com/office/drawing/2014/main" id="{8DC52F04-18C9-4D4F-9BC4-6B16CBD606F1}"/>
+              </a:ext>
+            </a:extLst>
+          </p:cNvPr>
+          <p:cNvSpPr>
+            <a:spLocks noGrp="1"/>
+          </p:cNvSpPr>
+          <p:nvPr>
+            <p:ph idx="1"/>
+          </p:nvPr>
+        </p:nvSpPr>
+        <p:spPr/>
+        <p:txBody>
+          <a:bodyPr/>
+          <a:lstStyle/>
+          <a:p>
+            <a:r>
+              <a:rPr lang="en-US" dirty="0"/>
+              <a:t>Took too long to train. Seems too many dimensions. Aborted</a:t>
+            </a:r>
+          </a:p>
+        </p:txBody>
+      </p:sp>
+    </p:spTree>
+    <p:extLst>
+      <p:ext uri="{BB962C8B-B14F-4D97-AF65-F5344CB8AC3E}">
+        <p14:creationId xmlns:p14="http://schemas.microsoft.com/office/powerpoint/2010/main" val="2683090839"/>
+      </p:ext>
+    </p:extLst>
+  </p:cSld>
+  <p:clrMapOvr>
+    <a:masterClrMapping/>
+  </p:clrMapOvr>
+</p:sld>
+</file>
+
 <file path=ppt/slides/slide2.xml><?xml version="1.0" encoding="utf-8"?>
 <p:sld xmlns:a="http://schemas.openxmlformats.org/drawingml/2006/main" xmlns:r="http://schemas.openxmlformats.org/officeDocument/2006/relationships" xmlns:p="http://schemas.openxmlformats.org/presentationml/2006/main">
   <p:cSld>
@@ -5359,23 +5351,7 @@
             </a:r>
             <a:r>
               <a:rPr lang="en-US" dirty="0"/>
-              <a:t>: No, we could not predict the race of an arrested person by much more than random guessing. (0.56 accuracy)</a:t>
-            </a:r>
-          </a:p>
-          <a:p>
-            <a:r>
-              <a:rPr lang="en-US" dirty="0"/>
-              <a:t>If these predictions cannot be improved, then it means </a:t>
-            </a:r>
-            <a:r>
-              <a:rPr lang="en-US" dirty="0">
-                <a:solidFill>
-                  <a:schemeClr val="accent6">
-                    <a:lumMod val="75000"/>
-                  </a:schemeClr>
-                </a:solidFill>
-              </a:rPr>
-              <a:t>arrests in NYC do not predict on race. </a:t>
+              <a:t>:  (0.56 precision) (0.85 recall) (0.69 F1 score) for Black</a:t>
             </a:r>
           </a:p>
           <a:p>
@@ -5400,92 +5376,6 @@
 </file>
 
 <file path=ppt/slides/slide20.xml><?xml version="1.0" encoding="utf-8"?>
-<p:sld xmlns:a="http://schemas.openxmlformats.org/drawingml/2006/main" xmlns:r="http://schemas.openxmlformats.org/officeDocument/2006/relationships" xmlns:p="http://schemas.openxmlformats.org/presentationml/2006/main">
-  <p:cSld>
-    <p:spTree>
-      <p:nvGrpSpPr>
-        <p:cNvPr id="1" name=""/>
-        <p:cNvGrpSpPr/>
-        <p:nvPr/>
-      </p:nvGrpSpPr>
-      <p:grpSpPr>
-        <a:xfrm>
-          <a:off x="0" y="0"/>
-          <a:ext cx="0" cy="0"/>
-          <a:chOff x="0" y="0"/>
-          <a:chExt cx="0" cy="0"/>
-        </a:xfrm>
-      </p:grpSpPr>
-      <p:sp>
-        <p:nvSpPr>
-          <p:cNvPr id="2" name="Title 1">
-            <a:extLst>
-              <a:ext uri="{FF2B5EF4-FFF2-40B4-BE49-F238E27FC236}">
-                <a16:creationId xmlns:a16="http://schemas.microsoft.com/office/drawing/2014/main" id="{C577F47D-AA01-CE4E-8010-008851E94B25}"/>
-              </a:ext>
-            </a:extLst>
-          </p:cNvPr>
-          <p:cNvSpPr>
-            <a:spLocks noGrp="1"/>
-          </p:cNvSpPr>
-          <p:nvPr>
-            <p:ph type="title"/>
-          </p:nvPr>
-        </p:nvSpPr>
-        <p:spPr/>
-        <p:txBody>
-          <a:bodyPr/>
-          <a:lstStyle/>
-          <a:p>
-            <a:r>
-              <a:rPr lang="en-US" dirty="0"/>
-              <a:t>KNeighbours</a:t>
-            </a:r>
-          </a:p>
-        </p:txBody>
-      </p:sp>
-      <p:sp>
-        <p:nvSpPr>
-          <p:cNvPr id="3" name="Content Placeholder 2">
-            <a:extLst>
-              <a:ext uri="{FF2B5EF4-FFF2-40B4-BE49-F238E27FC236}">
-                <a16:creationId xmlns:a16="http://schemas.microsoft.com/office/drawing/2014/main" id="{8DC52F04-18C9-4D4F-9BC4-6B16CBD606F1}"/>
-              </a:ext>
-            </a:extLst>
-          </p:cNvPr>
-          <p:cNvSpPr>
-            <a:spLocks noGrp="1"/>
-          </p:cNvSpPr>
-          <p:nvPr>
-            <p:ph idx="1"/>
-          </p:nvPr>
-        </p:nvSpPr>
-        <p:spPr/>
-        <p:txBody>
-          <a:bodyPr/>
-          <a:lstStyle/>
-          <a:p>
-            <a:r>
-              <a:rPr lang="en-US" dirty="0"/>
-              <a:t>Took too long to train. Seems too many dimensions. Aborted</a:t>
-            </a:r>
-          </a:p>
-        </p:txBody>
-      </p:sp>
-    </p:spTree>
-    <p:extLst>
-      <p:ext uri="{BB962C8B-B14F-4D97-AF65-F5344CB8AC3E}">
-        <p14:creationId xmlns:p14="http://schemas.microsoft.com/office/powerpoint/2010/main" val="2683090839"/>
-      </p:ext>
-    </p:extLst>
-  </p:cSld>
-  <p:clrMapOvr>
-    <a:masterClrMapping/>
-  </p:clrMapOvr>
-</p:sld>
-</file>
-
-<file path=ppt/slides/slide21.xml><?xml version="1.0" encoding="utf-8"?>
 <p:sld xmlns:a="http://schemas.openxmlformats.org/drawingml/2006/main" xmlns:r="http://schemas.openxmlformats.org/officeDocument/2006/relationships" xmlns:p="http://schemas.openxmlformats.org/presentationml/2006/main">
   <p:cSld>
     <p:spTree>
@@ -5604,7 +5494,7 @@
 </p:sld>
 </file>
 
-<file path=ppt/slides/slide22.xml><?xml version="1.0" encoding="utf-8"?>
+<file path=ppt/slides/slide21.xml><?xml version="1.0" encoding="utf-8"?>
 <p:sld xmlns:a="http://schemas.openxmlformats.org/drawingml/2006/main" xmlns:r="http://schemas.openxmlformats.org/officeDocument/2006/relationships" xmlns:p="http://schemas.openxmlformats.org/presentationml/2006/main">
   <p:cSld>
     <p:spTree>
@@ -5694,7 +5584,7 @@
 </p:sld>
 </file>
 
-<file path=ppt/slides/slide23.xml><?xml version="1.0" encoding="utf-8"?>
+<file path=ppt/slides/slide22.xml><?xml version="1.0" encoding="utf-8"?>
 <p:sld xmlns:a="http://schemas.openxmlformats.org/drawingml/2006/main" xmlns:r="http://schemas.openxmlformats.org/officeDocument/2006/relationships" xmlns:p="http://schemas.openxmlformats.org/presentationml/2006/main">
   <p:cSld>
     <p:spTree>
@@ -6339,7 +6229,7 @@
           <p:cNvPr id="2" name="Title 1">
             <a:extLst>
               <a:ext uri="{FF2B5EF4-FFF2-40B4-BE49-F238E27FC236}">
-                <a16:creationId xmlns:a16="http://schemas.microsoft.com/office/drawing/2014/main" id="{4AA7C9A1-4B9E-B246-9477-0B828B57B252}"/>
+                <a16:creationId xmlns:a16="http://schemas.microsoft.com/office/drawing/2014/main" id="{58FD0EC0-89D9-4940-825F-83AA06611B02}"/>
               </a:ext>
             </a:extLst>
           </p:cNvPr>
@@ -6352,8 +6242,8 @@
         </p:nvSpPr>
         <p:spPr>
           <a:xfrm>
-            <a:off x="1185862" y="5468167"/>
-            <a:ext cx="11120438" cy="1325563"/>
+            <a:off x="636443" y="5380037"/>
+            <a:ext cx="11425237" cy="1325563"/>
           </a:xfrm>
         </p:spPr>
         <p:txBody>
@@ -6362,7 +6252,7 @@
           <a:p>
             <a:r>
               <a:rPr lang="en-US" dirty="0"/>
-              <a:t>Brooklyn leads in the number of felonies </a:t>
+              <a:t>Persons between ages 25 – 44 make up a majority of arrested</a:t>
             </a:r>
           </a:p>
         </p:txBody>
@@ -6372,7 +6262,7 @@
           <p:cNvPr id="4" name="Picture 3">
             <a:extLst>
               <a:ext uri="{FF2B5EF4-FFF2-40B4-BE49-F238E27FC236}">
-                <a16:creationId xmlns:a16="http://schemas.microsoft.com/office/drawing/2014/main" id="{C1128337-6A55-3F47-9DC7-0BA4A262549A}"/>
+                <a16:creationId xmlns:a16="http://schemas.microsoft.com/office/drawing/2014/main" id="{54753EDD-302E-E249-AAC3-19FF3721285A}"/>
               </a:ext>
             </a:extLst>
           </p:cNvPr>
@@ -6389,8 +6279,8 @@
         </p:blipFill>
         <p:spPr>
           <a:xfrm>
-            <a:off x="838200" y="275406"/>
-            <a:ext cx="9912350" cy="5192761"/>
+            <a:off x="1920670" y="152400"/>
+            <a:ext cx="7277100" cy="5372100"/>
           </a:xfrm>
           <a:prstGeom prst="rect">
             <a:avLst/>
@@ -6400,7 +6290,7 @@
     </p:spTree>
     <p:extLst>
       <p:ext uri="{BB962C8B-B14F-4D97-AF65-F5344CB8AC3E}">
-        <p14:creationId xmlns:p14="http://schemas.microsoft.com/office/powerpoint/2010/main" val="3435773873"/>
+        <p14:creationId xmlns:p14="http://schemas.microsoft.com/office/powerpoint/2010/main" val="432891080"/>
       </p:ext>
     </p:extLst>
   </p:cSld>
@@ -6432,7 +6322,7 @@
           <p:cNvPr id="2" name="Title 1">
             <a:extLst>
               <a:ext uri="{FF2B5EF4-FFF2-40B4-BE49-F238E27FC236}">
-                <a16:creationId xmlns:a16="http://schemas.microsoft.com/office/drawing/2014/main" id="{58FD0EC0-89D9-4940-825F-83AA06611B02}"/>
+                <a16:creationId xmlns:a16="http://schemas.microsoft.com/office/drawing/2014/main" id="{DCC04647-5B28-E746-8D55-E14BD3318677}"/>
               </a:ext>
             </a:extLst>
           </p:cNvPr>
@@ -6445,8 +6335,8 @@
         </p:nvSpPr>
         <p:spPr>
           <a:xfrm>
-            <a:off x="636443" y="5380037"/>
-            <a:ext cx="11425237" cy="1325563"/>
+            <a:off x="838200" y="5460998"/>
+            <a:ext cx="10515600" cy="1325563"/>
           </a:xfrm>
         </p:spPr>
         <p:txBody>
@@ -6455,7 +6345,7 @@
           <a:p>
             <a:r>
               <a:rPr lang="en-US" dirty="0"/>
-              <a:t>Persons between ages 25 – 44 make up a majority of arrested</a:t>
+              <a:t>Persons who are black are more likely to be arrested</a:t>
             </a:r>
           </a:p>
         </p:txBody>
@@ -6465,7 +6355,7 @@
           <p:cNvPr id="4" name="Picture 3">
             <a:extLst>
               <a:ext uri="{FF2B5EF4-FFF2-40B4-BE49-F238E27FC236}">
-                <a16:creationId xmlns:a16="http://schemas.microsoft.com/office/drawing/2014/main" id="{54753EDD-302E-E249-AAC3-19FF3721285A}"/>
+                <a16:creationId xmlns:a16="http://schemas.microsoft.com/office/drawing/2014/main" id="{6BFD21A5-E570-F849-BCDE-81A03153EBB1}"/>
               </a:ext>
             </a:extLst>
           </p:cNvPr>
@@ -6482,8 +6372,8 @@
         </p:blipFill>
         <p:spPr>
           <a:xfrm>
-            <a:off x="1920670" y="152400"/>
-            <a:ext cx="7277100" cy="5372100"/>
+            <a:off x="1300163" y="295271"/>
+            <a:ext cx="8904728" cy="5170694"/>
           </a:xfrm>
           <a:prstGeom prst="rect">
             <a:avLst/>
@@ -6493,7 +6383,7 @@
     </p:spTree>
     <p:extLst>
       <p:ext uri="{BB962C8B-B14F-4D97-AF65-F5344CB8AC3E}">
-        <p14:creationId xmlns:p14="http://schemas.microsoft.com/office/powerpoint/2010/main" val="432891080"/>
+        <p14:creationId xmlns:p14="http://schemas.microsoft.com/office/powerpoint/2010/main" val="2968209747"/>
       </p:ext>
     </p:extLst>
   </p:cSld>

</xml_diff>